<commit_message>
added Automation talk and updated various README's
</commit_message>
<xml_diff>
--- a/Git/GitTogether/GitTogether.pptx
+++ b/Git/GitTogether/GitTogether.pptx
@@ -50,7 +50,10 @@
       <a:spcAft>
         <a:spcPts val="0"/>
       </a:spcAft>
-      <a:buNone/>
+      <a:buClr>
+        <a:srgbClr val="000000"/>
+      </a:buClr>
+      <a:buFont typeface="Arial"/>
       <a:defRPr b="0" i="0" sz="1400" u="none" cap="none" strike="noStrike">
         <a:solidFill>
           <a:srgbClr val="000000"/>
@@ -71,7 +74,10 @@
       <a:spcAft>
         <a:spcPts val="0"/>
       </a:spcAft>
-      <a:buNone/>
+      <a:buClr>
+        <a:srgbClr val="000000"/>
+      </a:buClr>
+      <a:buFont typeface="Arial"/>
       <a:defRPr b="0" i="0" sz="1400" u="none" cap="none" strike="noStrike">
         <a:solidFill>
           <a:srgbClr val="000000"/>
@@ -92,7 +98,10 @@
       <a:spcAft>
         <a:spcPts val="0"/>
       </a:spcAft>
-      <a:buNone/>
+      <a:buClr>
+        <a:srgbClr val="000000"/>
+      </a:buClr>
+      <a:buFont typeface="Arial"/>
       <a:defRPr b="0" i="0" sz="1400" u="none" cap="none" strike="noStrike">
         <a:solidFill>
           <a:srgbClr val="000000"/>
@@ -113,7 +122,10 @@
       <a:spcAft>
         <a:spcPts val="0"/>
       </a:spcAft>
-      <a:buNone/>
+      <a:buClr>
+        <a:srgbClr val="000000"/>
+      </a:buClr>
+      <a:buFont typeface="Arial"/>
       <a:defRPr b="0" i="0" sz="1400" u="none" cap="none" strike="noStrike">
         <a:solidFill>
           <a:srgbClr val="000000"/>
@@ -134,7 +146,10 @@
       <a:spcAft>
         <a:spcPts val="0"/>
       </a:spcAft>
-      <a:buNone/>
+      <a:buClr>
+        <a:srgbClr val="000000"/>
+      </a:buClr>
+      <a:buFont typeface="Arial"/>
       <a:defRPr b="0" i="0" sz="1400" u="none" cap="none" strike="noStrike">
         <a:solidFill>
           <a:srgbClr val="000000"/>
@@ -155,7 +170,10 @@
       <a:spcAft>
         <a:spcPts val="0"/>
       </a:spcAft>
-      <a:buNone/>
+      <a:buClr>
+        <a:srgbClr val="000000"/>
+      </a:buClr>
+      <a:buFont typeface="Arial"/>
       <a:defRPr b="0" i="0" sz="1400" u="none" cap="none" strike="noStrike">
         <a:solidFill>
           <a:srgbClr val="000000"/>
@@ -176,7 +194,10 @@
       <a:spcAft>
         <a:spcPts val="0"/>
       </a:spcAft>
-      <a:buNone/>
+      <a:buClr>
+        <a:srgbClr val="000000"/>
+      </a:buClr>
+      <a:buFont typeface="Arial"/>
       <a:defRPr b="0" i="0" sz="1400" u="none" cap="none" strike="noStrike">
         <a:solidFill>
           <a:srgbClr val="000000"/>
@@ -197,7 +218,10 @@
       <a:spcAft>
         <a:spcPts val="0"/>
       </a:spcAft>
-      <a:buNone/>
+      <a:buClr>
+        <a:srgbClr val="000000"/>
+      </a:buClr>
+      <a:buFont typeface="Arial"/>
       <a:defRPr b="0" i="0" sz="1400" u="none" cap="none" strike="noStrike">
         <a:solidFill>
           <a:srgbClr val="000000"/>
@@ -218,7 +242,10 @@
       <a:spcAft>
         <a:spcPts val="0"/>
       </a:spcAft>
-      <a:buNone/>
+      <a:buClr>
+        <a:srgbClr val="000000"/>
+      </a:buClr>
+      <a:buFont typeface="Arial"/>
       <a:defRPr b="0" i="0" sz="1400" u="none" cap="none" strike="noStrike">
         <a:solidFill>
           <a:srgbClr val="000000"/>
@@ -433,6 +460,235 @@
     </p:spTree>
   </p:cSld>
   <p:clrMap accent1="accent1" accent2="accent2" accent3="accent3" accent4="accent4" accent5="accent5" accent6="accent6" bg1="lt1" bg2="dk2" tx1="dk1" tx2="lt2" folHlink="folHlink" hlink="hlink"/>
+  <p:notesStyle>
+    <a:defPPr lvl="0" marR="0" rtl="0" algn="l">
+      <a:lnSpc>
+        <a:spcPct val="100000"/>
+      </a:lnSpc>
+      <a:spcBef>
+        <a:spcPts val="0"/>
+      </a:spcBef>
+      <a:spcAft>
+        <a:spcPts val="0"/>
+      </a:spcAft>
+    </a:defPPr>
+    <a:lvl1pPr lvl="0" marR="0" rtl="0" algn="l">
+      <a:lnSpc>
+        <a:spcPct val="100000"/>
+      </a:lnSpc>
+      <a:spcBef>
+        <a:spcPts val="0"/>
+      </a:spcBef>
+      <a:spcAft>
+        <a:spcPts val="0"/>
+      </a:spcAft>
+      <a:buClr>
+        <a:srgbClr val="000000"/>
+      </a:buClr>
+      <a:buFont typeface="Arial"/>
+      <a:defRPr b="0" i="0" sz="1400" u="none" cap="none" strike="noStrike">
+        <a:solidFill>
+          <a:srgbClr val="000000"/>
+        </a:solidFill>
+        <a:latin typeface="Arial"/>
+        <a:ea typeface="Arial"/>
+        <a:cs typeface="Arial"/>
+        <a:sym typeface="Arial"/>
+      </a:defRPr>
+    </a:lvl1pPr>
+    <a:lvl2pPr lvl="1" marR="0" rtl="0" algn="l">
+      <a:lnSpc>
+        <a:spcPct val="100000"/>
+      </a:lnSpc>
+      <a:spcBef>
+        <a:spcPts val="0"/>
+      </a:spcBef>
+      <a:spcAft>
+        <a:spcPts val="0"/>
+      </a:spcAft>
+      <a:buClr>
+        <a:srgbClr val="000000"/>
+      </a:buClr>
+      <a:buFont typeface="Arial"/>
+      <a:defRPr b="0" i="0" sz="1400" u="none" cap="none" strike="noStrike">
+        <a:solidFill>
+          <a:srgbClr val="000000"/>
+        </a:solidFill>
+        <a:latin typeface="Arial"/>
+        <a:ea typeface="Arial"/>
+        <a:cs typeface="Arial"/>
+        <a:sym typeface="Arial"/>
+      </a:defRPr>
+    </a:lvl2pPr>
+    <a:lvl3pPr lvl="2" marR="0" rtl="0" algn="l">
+      <a:lnSpc>
+        <a:spcPct val="100000"/>
+      </a:lnSpc>
+      <a:spcBef>
+        <a:spcPts val="0"/>
+      </a:spcBef>
+      <a:spcAft>
+        <a:spcPts val="0"/>
+      </a:spcAft>
+      <a:buClr>
+        <a:srgbClr val="000000"/>
+      </a:buClr>
+      <a:buFont typeface="Arial"/>
+      <a:defRPr b="0" i="0" sz="1400" u="none" cap="none" strike="noStrike">
+        <a:solidFill>
+          <a:srgbClr val="000000"/>
+        </a:solidFill>
+        <a:latin typeface="Arial"/>
+        <a:ea typeface="Arial"/>
+        <a:cs typeface="Arial"/>
+        <a:sym typeface="Arial"/>
+      </a:defRPr>
+    </a:lvl3pPr>
+    <a:lvl4pPr lvl="3" marR="0" rtl="0" algn="l">
+      <a:lnSpc>
+        <a:spcPct val="100000"/>
+      </a:lnSpc>
+      <a:spcBef>
+        <a:spcPts val="0"/>
+      </a:spcBef>
+      <a:spcAft>
+        <a:spcPts val="0"/>
+      </a:spcAft>
+      <a:buClr>
+        <a:srgbClr val="000000"/>
+      </a:buClr>
+      <a:buFont typeface="Arial"/>
+      <a:defRPr b="0" i="0" sz="1400" u="none" cap="none" strike="noStrike">
+        <a:solidFill>
+          <a:srgbClr val="000000"/>
+        </a:solidFill>
+        <a:latin typeface="Arial"/>
+        <a:ea typeface="Arial"/>
+        <a:cs typeface="Arial"/>
+        <a:sym typeface="Arial"/>
+      </a:defRPr>
+    </a:lvl4pPr>
+    <a:lvl5pPr lvl="4" marR="0" rtl="0" algn="l">
+      <a:lnSpc>
+        <a:spcPct val="100000"/>
+      </a:lnSpc>
+      <a:spcBef>
+        <a:spcPts val="0"/>
+      </a:spcBef>
+      <a:spcAft>
+        <a:spcPts val="0"/>
+      </a:spcAft>
+      <a:buClr>
+        <a:srgbClr val="000000"/>
+      </a:buClr>
+      <a:buFont typeface="Arial"/>
+      <a:defRPr b="0" i="0" sz="1400" u="none" cap="none" strike="noStrike">
+        <a:solidFill>
+          <a:srgbClr val="000000"/>
+        </a:solidFill>
+        <a:latin typeface="Arial"/>
+        <a:ea typeface="Arial"/>
+        <a:cs typeface="Arial"/>
+        <a:sym typeface="Arial"/>
+      </a:defRPr>
+    </a:lvl5pPr>
+    <a:lvl6pPr lvl="5" marR="0" rtl="0" algn="l">
+      <a:lnSpc>
+        <a:spcPct val="100000"/>
+      </a:lnSpc>
+      <a:spcBef>
+        <a:spcPts val="0"/>
+      </a:spcBef>
+      <a:spcAft>
+        <a:spcPts val="0"/>
+      </a:spcAft>
+      <a:buClr>
+        <a:srgbClr val="000000"/>
+      </a:buClr>
+      <a:buFont typeface="Arial"/>
+      <a:defRPr b="0" i="0" sz="1400" u="none" cap="none" strike="noStrike">
+        <a:solidFill>
+          <a:srgbClr val="000000"/>
+        </a:solidFill>
+        <a:latin typeface="Arial"/>
+        <a:ea typeface="Arial"/>
+        <a:cs typeface="Arial"/>
+        <a:sym typeface="Arial"/>
+      </a:defRPr>
+    </a:lvl6pPr>
+    <a:lvl7pPr lvl="6" marR="0" rtl="0" algn="l">
+      <a:lnSpc>
+        <a:spcPct val="100000"/>
+      </a:lnSpc>
+      <a:spcBef>
+        <a:spcPts val="0"/>
+      </a:spcBef>
+      <a:spcAft>
+        <a:spcPts val="0"/>
+      </a:spcAft>
+      <a:buClr>
+        <a:srgbClr val="000000"/>
+      </a:buClr>
+      <a:buFont typeface="Arial"/>
+      <a:defRPr b="0" i="0" sz="1400" u="none" cap="none" strike="noStrike">
+        <a:solidFill>
+          <a:srgbClr val="000000"/>
+        </a:solidFill>
+        <a:latin typeface="Arial"/>
+        <a:ea typeface="Arial"/>
+        <a:cs typeface="Arial"/>
+        <a:sym typeface="Arial"/>
+      </a:defRPr>
+    </a:lvl7pPr>
+    <a:lvl8pPr lvl="7" marR="0" rtl="0" algn="l">
+      <a:lnSpc>
+        <a:spcPct val="100000"/>
+      </a:lnSpc>
+      <a:spcBef>
+        <a:spcPts val="0"/>
+      </a:spcBef>
+      <a:spcAft>
+        <a:spcPts val="0"/>
+      </a:spcAft>
+      <a:buClr>
+        <a:srgbClr val="000000"/>
+      </a:buClr>
+      <a:buFont typeface="Arial"/>
+      <a:defRPr b="0" i="0" sz="1400" u="none" cap="none" strike="noStrike">
+        <a:solidFill>
+          <a:srgbClr val="000000"/>
+        </a:solidFill>
+        <a:latin typeface="Arial"/>
+        <a:ea typeface="Arial"/>
+        <a:cs typeface="Arial"/>
+        <a:sym typeface="Arial"/>
+      </a:defRPr>
+    </a:lvl8pPr>
+    <a:lvl9pPr lvl="8" marR="0" rtl="0" algn="l">
+      <a:lnSpc>
+        <a:spcPct val="100000"/>
+      </a:lnSpc>
+      <a:spcBef>
+        <a:spcPts val="0"/>
+      </a:spcBef>
+      <a:spcAft>
+        <a:spcPts val="0"/>
+      </a:spcAft>
+      <a:buClr>
+        <a:srgbClr val="000000"/>
+      </a:buClr>
+      <a:buFont typeface="Arial"/>
+      <a:defRPr b="0" i="0" sz="1400" u="none" cap="none" strike="noStrike">
+        <a:solidFill>
+          <a:srgbClr val="000000"/>
+        </a:solidFill>
+        <a:latin typeface="Arial"/>
+        <a:ea typeface="Arial"/>
+        <a:cs typeface="Arial"/>
+        <a:sym typeface="Arial"/>
+      </a:defRPr>
+    </a:lvl9pPr>
+  </p:notesStyle>
 </p:notesMaster>
 </file>
 
@@ -1349,8 +1605,8 @@
 </file>
 
 <file path=ppt/slideLayouts/slideLayout1.xml><?xml version="1.0" encoding="utf-8"?>
-<p:sldLayout xmlns:a="http://schemas.openxmlformats.org/drawingml/2006/main" xmlns:r="http://schemas.openxmlformats.org/officeDocument/2006/relationships" xmlns:mc="http://schemas.openxmlformats.org/markup-compatibility/2006" xmlns:mv="urn:schemas-microsoft-com:mac:vml" xmlns:p="http://schemas.openxmlformats.org/presentationml/2006/main" xmlns:c="http://schemas.openxmlformats.org/drawingml/2006/chart" xmlns:dgm="http://schemas.openxmlformats.org/drawingml/2006/diagram" xmlns:o="urn:schemas-microsoft-com:office:office" xmlns:v="urn:schemas-microsoft-com:vml" xmlns:pvml="urn:schemas-microsoft-com:office:powerpoint" xmlns:com="http://schemas.openxmlformats.org/drawingml/2006/compatibility" xmlns:p14="http://schemas.microsoft.com/office/powerpoint/2010/main" xmlns:p15="http://schemas.microsoft.com/office/powerpoint/2012/main" type="title">
-  <p:cSld name="Title Slide">
+<p:sldLayout xmlns:a="http://schemas.openxmlformats.org/drawingml/2006/main" xmlns:r="http://schemas.openxmlformats.org/officeDocument/2006/relationships" xmlns:mc="http://schemas.openxmlformats.org/markup-compatibility/2006" xmlns:mv="urn:schemas-microsoft-com:mac:vml" xmlns:p="http://schemas.openxmlformats.org/presentationml/2006/main" xmlns:c="http://schemas.openxmlformats.org/drawingml/2006/chart" xmlns:dgm="http://schemas.openxmlformats.org/drawingml/2006/diagram" xmlns:o="urn:schemas-microsoft-com:office:office" xmlns:v="urn:schemas-microsoft-com:vml" xmlns:pvml="urn:schemas-microsoft-com:office:powerpoint" xmlns:com="http://schemas.openxmlformats.org/drawingml/2006/compatibility" xmlns:p14="http://schemas.microsoft.com/office/powerpoint/2010/main" xmlns:p15="http://schemas.microsoft.com/office/powerpoint/2012/main" matchingName="Title Slide" type="title">
+  <p:cSld name="TITLE">
     <p:spTree>
       <p:nvGrpSpPr>
         <p:cNvPr id="11" name="Shape 11"/>
@@ -2597,8 +2853,8 @@
 </file>
 
 <file path=ppt/slideLayouts/slideLayout10.xml><?xml version="1.0" encoding="utf-8"?>
-<p:sldLayout xmlns:a="http://schemas.openxmlformats.org/drawingml/2006/main" xmlns:r="http://schemas.openxmlformats.org/officeDocument/2006/relationships" xmlns:mc="http://schemas.openxmlformats.org/markup-compatibility/2006" xmlns:mv="urn:schemas-microsoft-com:mac:vml" xmlns:p="http://schemas.openxmlformats.org/presentationml/2006/main" xmlns:c="http://schemas.openxmlformats.org/drawingml/2006/chart" xmlns:dgm="http://schemas.openxmlformats.org/drawingml/2006/diagram" xmlns:o="urn:schemas-microsoft-com:office:office" xmlns:v="urn:schemas-microsoft-com:vml" xmlns:pvml="urn:schemas-microsoft-com:office:powerpoint" xmlns:com="http://schemas.openxmlformats.org/drawingml/2006/compatibility" xmlns:p14="http://schemas.microsoft.com/office/powerpoint/2010/main" xmlns:p15="http://schemas.microsoft.com/office/powerpoint/2012/main" type="vertTx">
-  <p:cSld name="Title and Vertical Text">
+<p:sldLayout xmlns:a="http://schemas.openxmlformats.org/drawingml/2006/main" xmlns:r="http://schemas.openxmlformats.org/officeDocument/2006/relationships" xmlns:mc="http://schemas.openxmlformats.org/markup-compatibility/2006" xmlns:mv="urn:schemas-microsoft-com:mac:vml" xmlns:p="http://schemas.openxmlformats.org/presentationml/2006/main" xmlns:c="http://schemas.openxmlformats.org/drawingml/2006/chart" xmlns:dgm="http://schemas.openxmlformats.org/drawingml/2006/diagram" xmlns:o="urn:schemas-microsoft-com:office:office" xmlns:v="urn:schemas-microsoft-com:vml" xmlns:pvml="urn:schemas-microsoft-com:office:powerpoint" xmlns:com="http://schemas.openxmlformats.org/drawingml/2006/compatibility" xmlns:p14="http://schemas.microsoft.com/office/powerpoint/2010/main" xmlns:p15="http://schemas.microsoft.com/office/powerpoint/2012/main" matchingName="Title and Vertical Text" type="vertTx">
+  <p:cSld name="VERTICAL_TEXT">
     <p:spTree>
       <p:nvGrpSpPr>
         <p:cNvPr id="68" name="Shape 68"/>
@@ -3845,8 +4101,8 @@
 </file>
 
 <file path=ppt/slideLayouts/slideLayout11.xml><?xml version="1.0" encoding="utf-8"?>
-<p:sldLayout xmlns:a="http://schemas.openxmlformats.org/drawingml/2006/main" xmlns:r="http://schemas.openxmlformats.org/officeDocument/2006/relationships" xmlns:mc="http://schemas.openxmlformats.org/markup-compatibility/2006" xmlns:mv="urn:schemas-microsoft-com:mac:vml" xmlns:p="http://schemas.openxmlformats.org/presentationml/2006/main" xmlns:c="http://schemas.openxmlformats.org/drawingml/2006/chart" xmlns:dgm="http://schemas.openxmlformats.org/drawingml/2006/diagram" xmlns:o="urn:schemas-microsoft-com:office:office" xmlns:v="urn:schemas-microsoft-com:vml" xmlns:pvml="urn:schemas-microsoft-com:office:powerpoint" xmlns:com="http://schemas.openxmlformats.org/drawingml/2006/compatibility" xmlns:p14="http://schemas.microsoft.com/office/powerpoint/2010/main" xmlns:p15="http://schemas.microsoft.com/office/powerpoint/2012/main" type="vertTitleAndTx">
-  <p:cSld name="Vertical Title and Text">
+<p:sldLayout xmlns:a="http://schemas.openxmlformats.org/drawingml/2006/main" xmlns:r="http://schemas.openxmlformats.org/officeDocument/2006/relationships" xmlns:mc="http://schemas.openxmlformats.org/markup-compatibility/2006" xmlns:mv="urn:schemas-microsoft-com:mac:vml" xmlns:p="http://schemas.openxmlformats.org/presentationml/2006/main" xmlns:c="http://schemas.openxmlformats.org/drawingml/2006/chart" xmlns:dgm="http://schemas.openxmlformats.org/drawingml/2006/diagram" xmlns:o="urn:schemas-microsoft-com:office:office" xmlns:v="urn:schemas-microsoft-com:vml" xmlns:pvml="urn:schemas-microsoft-com:office:powerpoint" xmlns:com="http://schemas.openxmlformats.org/drawingml/2006/compatibility" xmlns:p14="http://schemas.microsoft.com/office/powerpoint/2010/main" xmlns:p15="http://schemas.microsoft.com/office/powerpoint/2012/main" matchingName="Vertical Title and Text" type="vertTitleAndTx">
+  <p:cSld name="VERTICAL_TITLE_AND_VERTICAL_TEXT">
     <p:spTree>
       <p:nvGrpSpPr>
         <p:cNvPr id="74" name="Shape 74"/>
@@ -5093,8 +5349,8 @@
 </file>
 
 <file path=ppt/slideLayouts/slideLayout2.xml><?xml version="1.0" encoding="utf-8"?>
-<p:sldLayout xmlns:a="http://schemas.openxmlformats.org/drawingml/2006/main" xmlns:r="http://schemas.openxmlformats.org/officeDocument/2006/relationships" xmlns:mc="http://schemas.openxmlformats.org/markup-compatibility/2006" xmlns:mv="urn:schemas-microsoft-com:mac:vml" xmlns:p="http://schemas.openxmlformats.org/presentationml/2006/main" xmlns:c="http://schemas.openxmlformats.org/drawingml/2006/chart" xmlns:dgm="http://schemas.openxmlformats.org/drawingml/2006/diagram" xmlns:o="urn:schemas-microsoft-com:office:office" xmlns:v="urn:schemas-microsoft-com:vml" xmlns:pvml="urn:schemas-microsoft-com:office:powerpoint" xmlns:com="http://schemas.openxmlformats.org/drawingml/2006/compatibility" xmlns:p14="http://schemas.microsoft.com/office/powerpoint/2010/main" xmlns:p15="http://schemas.microsoft.com/office/powerpoint/2012/main" type="obj">
-  <p:cSld name="Title and Content">
+<p:sldLayout xmlns:a="http://schemas.openxmlformats.org/drawingml/2006/main" xmlns:r="http://schemas.openxmlformats.org/officeDocument/2006/relationships" xmlns:mc="http://schemas.openxmlformats.org/markup-compatibility/2006" xmlns:mv="urn:schemas-microsoft-com:mac:vml" xmlns:p="http://schemas.openxmlformats.org/presentationml/2006/main" xmlns:c="http://schemas.openxmlformats.org/drawingml/2006/chart" xmlns:dgm="http://schemas.openxmlformats.org/drawingml/2006/diagram" xmlns:o="urn:schemas-microsoft-com:office:office" xmlns:v="urn:schemas-microsoft-com:vml" xmlns:pvml="urn:schemas-microsoft-com:office:powerpoint" xmlns:com="http://schemas.openxmlformats.org/drawingml/2006/compatibility" xmlns:p14="http://schemas.microsoft.com/office/powerpoint/2010/main" xmlns:p15="http://schemas.microsoft.com/office/powerpoint/2012/main" matchingName="Title and Content" type="obj">
+  <p:cSld name="OBJECT">
     <p:spTree>
       <p:nvGrpSpPr>
         <p:cNvPr id="17" name="Shape 17"/>
@@ -6341,8 +6597,8 @@
 </file>
 
 <file path=ppt/slideLayouts/slideLayout3.xml><?xml version="1.0" encoding="utf-8"?>
-<p:sldLayout xmlns:a="http://schemas.openxmlformats.org/drawingml/2006/main" xmlns:r="http://schemas.openxmlformats.org/officeDocument/2006/relationships" xmlns:mc="http://schemas.openxmlformats.org/markup-compatibility/2006" xmlns:mv="urn:schemas-microsoft-com:mac:vml" xmlns:p="http://schemas.openxmlformats.org/presentationml/2006/main" xmlns:c="http://schemas.openxmlformats.org/drawingml/2006/chart" xmlns:dgm="http://schemas.openxmlformats.org/drawingml/2006/diagram" xmlns:o="urn:schemas-microsoft-com:office:office" xmlns:v="urn:schemas-microsoft-com:vml" xmlns:pvml="urn:schemas-microsoft-com:office:powerpoint" xmlns:com="http://schemas.openxmlformats.org/drawingml/2006/compatibility" xmlns:p14="http://schemas.microsoft.com/office/powerpoint/2010/main" xmlns:p15="http://schemas.microsoft.com/office/powerpoint/2012/main" type="blank">
-  <p:cSld name="Blank">
+<p:sldLayout xmlns:a="http://schemas.openxmlformats.org/drawingml/2006/main" xmlns:r="http://schemas.openxmlformats.org/officeDocument/2006/relationships" xmlns:mc="http://schemas.openxmlformats.org/markup-compatibility/2006" xmlns:mv="urn:schemas-microsoft-com:mac:vml" xmlns:p="http://schemas.openxmlformats.org/presentationml/2006/main" xmlns:c="http://schemas.openxmlformats.org/drawingml/2006/chart" xmlns:dgm="http://schemas.openxmlformats.org/drawingml/2006/diagram" xmlns:o="urn:schemas-microsoft-com:office:office" xmlns:v="urn:schemas-microsoft-com:vml" xmlns:pvml="urn:schemas-microsoft-com:office:powerpoint" xmlns:com="http://schemas.openxmlformats.org/drawingml/2006/compatibility" xmlns:p14="http://schemas.microsoft.com/office/powerpoint/2010/main" xmlns:p15="http://schemas.microsoft.com/office/powerpoint/2012/main" matchingName="Blank" type="blank">
+  <p:cSld name="BLANK">
     <p:spTree>
       <p:nvGrpSpPr>
         <p:cNvPr id="23" name="Shape 23"/>
@@ -7177,8 +7433,8 @@
 </file>
 
 <file path=ppt/slideLayouts/slideLayout4.xml><?xml version="1.0" encoding="utf-8"?>
-<p:sldLayout xmlns:a="http://schemas.openxmlformats.org/drawingml/2006/main" xmlns:r="http://schemas.openxmlformats.org/officeDocument/2006/relationships" xmlns:mc="http://schemas.openxmlformats.org/markup-compatibility/2006" xmlns:mv="urn:schemas-microsoft-com:mac:vml" xmlns:p="http://schemas.openxmlformats.org/presentationml/2006/main" xmlns:c="http://schemas.openxmlformats.org/drawingml/2006/chart" xmlns:dgm="http://schemas.openxmlformats.org/drawingml/2006/diagram" xmlns:o="urn:schemas-microsoft-com:office:office" xmlns:v="urn:schemas-microsoft-com:vml" xmlns:pvml="urn:schemas-microsoft-com:office:powerpoint" xmlns:com="http://schemas.openxmlformats.org/drawingml/2006/compatibility" xmlns:p14="http://schemas.microsoft.com/office/powerpoint/2010/main" xmlns:p15="http://schemas.microsoft.com/office/powerpoint/2012/main" type="secHead">
-  <p:cSld name="Section Header">
+<p:sldLayout xmlns:a="http://schemas.openxmlformats.org/drawingml/2006/main" xmlns:r="http://schemas.openxmlformats.org/officeDocument/2006/relationships" xmlns:mc="http://schemas.openxmlformats.org/markup-compatibility/2006" xmlns:mv="urn:schemas-microsoft-com:mac:vml" xmlns:p="http://schemas.openxmlformats.org/presentationml/2006/main" xmlns:c="http://schemas.openxmlformats.org/drawingml/2006/chart" xmlns:dgm="http://schemas.openxmlformats.org/drawingml/2006/diagram" xmlns:o="urn:schemas-microsoft-com:office:office" xmlns:v="urn:schemas-microsoft-com:vml" xmlns:pvml="urn:schemas-microsoft-com:office:powerpoint" xmlns:com="http://schemas.openxmlformats.org/drawingml/2006/compatibility" xmlns:p14="http://schemas.microsoft.com/office/powerpoint/2010/main" xmlns:p15="http://schemas.microsoft.com/office/powerpoint/2012/main" matchingName="Section Header" type="secHead">
+  <p:cSld name="SECTION_HEADER">
     <p:spTree>
       <p:nvGrpSpPr>
         <p:cNvPr id="27" name="Shape 27"/>
@@ -8425,8 +8681,8 @@
 </file>
 
 <file path=ppt/slideLayouts/slideLayout5.xml><?xml version="1.0" encoding="utf-8"?>
-<p:sldLayout xmlns:a="http://schemas.openxmlformats.org/drawingml/2006/main" xmlns:r="http://schemas.openxmlformats.org/officeDocument/2006/relationships" xmlns:mc="http://schemas.openxmlformats.org/markup-compatibility/2006" xmlns:mv="urn:schemas-microsoft-com:mac:vml" xmlns:p="http://schemas.openxmlformats.org/presentationml/2006/main" xmlns:c="http://schemas.openxmlformats.org/drawingml/2006/chart" xmlns:dgm="http://schemas.openxmlformats.org/drawingml/2006/diagram" xmlns:o="urn:schemas-microsoft-com:office:office" xmlns:v="urn:schemas-microsoft-com:vml" xmlns:pvml="urn:schemas-microsoft-com:office:powerpoint" xmlns:com="http://schemas.openxmlformats.org/drawingml/2006/compatibility" xmlns:p14="http://schemas.microsoft.com/office/powerpoint/2010/main" xmlns:p15="http://schemas.microsoft.com/office/powerpoint/2012/main" type="twoObj">
-  <p:cSld name="Two Content">
+<p:sldLayout xmlns:a="http://schemas.openxmlformats.org/drawingml/2006/main" xmlns:r="http://schemas.openxmlformats.org/officeDocument/2006/relationships" xmlns:mc="http://schemas.openxmlformats.org/markup-compatibility/2006" xmlns:mv="urn:schemas-microsoft-com:mac:vml" xmlns:p="http://schemas.openxmlformats.org/presentationml/2006/main" xmlns:c="http://schemas.openxmlformats.org/drawingml/2006/chart" xmlns:dgm="http://schemas.openxmlformats.org/drawingml/2006/diagram" xmlns:o="urn:schemas-microsoft-com:office:office" xmlns:v="urn:schemas-microsoft-com:vml" xmlns:pvml="urn:schemas-microsoft-com:office:powerpoint" xmlns:com="http://schemas.openxmlformats.org/drawingml/2006/compatibility" xmlns:p14="http://schemas.microsoft.com/office/powerpoint/2010/main" xmlns:p15="http://schemas.microsoft.com/office/powerpoint/2012/main" matchingName="Two Content" type="twoObj">
+  <p:cSld name="TWO_OBJECTS">
     <p:spTree>
       <p:nvGrpSpPr>
         <p:cNvPr id="33" name="Shape 33"/>
@@ -9935,8 +10191,8 @@
 </file>
 
 <file path=ppt/slideLayouts/slideLayout6.xml><?xml version="1.0" encoding="utf-8"?>
-<p:sldLayout xmlns:a="http://schemas.openxmlformats.org/drawingml/2006/main" xmlns:r="http://schemas.openxmlformats.org/officeDocument/2006/relationships" xmlns:mc="http://schemas.openxmlformats.org/markup-compatibility/2006" xmlns:mv="urn:schemas-microsoft-com:mac:vml" xmlns:p="http://schemas.openxmlformats.org/presentationml/2006/main" xmlns:c="http://schemas.openxmlformats.org/drawingml/2006/chart" xmlns:dgm="http://schemas.openxmlformats.org/drawingml/2006/diagram" xmlns:o="urn:schemas-microsoft-com:office:office" xmlns:v="urn:schemas-microsoft-com:vml" xmlns:pvml="urn:schemas-microsoft-com:office:powerpoint" xmlns:com="http://schemas.openxmlformats.org/drawingml/2006/compatibility" xmlns:p14="http://schemas.microsoft.com/office/powerpoint/2010/main" xmlns:p15="http://schemas.microsoft.com/office/powerpoint/2012/main" type="twoTxTwoObj">
-  <p:cSld name="Comparison">
+<p:sldLayout xmlns:a="http://schemas.openxmlformats.org/drawingml/2006/main" xmlns:r="http://schemas.openxmlformats.org/officeDocument/2006/relationships" xmlns:mc="http://schemas.openxmlformats.org/markup-compatibility/2006" xmlns:mv="urn:schemas-microsoft-com:mac:vml" xmlns:p="http://schemas.openxmlformats.org/presentationml/2006/main" xmlns:c="http://schemas.openxmlformats.org/drawingml/2006/chart" xmlns:dgm="http://schemas.openxmlformats.org/drawingml/2006/diagram" xmlns:o="urn:schemas-microsoft-com:office:office" xmlns:v="urn:schemas-microsoft-com:vml" xmlns:pvml="urn:schemas-microsoft-com:office:powerpoint" xmlns:com="http://schemas.openxmlformats.org/drawingml/2006/compatibility" xmlns:p14="http://schemas.microsoft.com/office/powerpoint/2010/main" xmlns:p15="http://schemas.microsoft.com/office/powerpoint/2012/main" matchingName="Comparison" type="twoTxTwoObj">
+  <p:cSld name="TWO_OBJECTS_WITH_TEXT">
     <p:spTree>
       <p:nvGrpSpPr>
         <p:cNvPr id="40" name="Shape 40"/>
@@ -11969,8 +12225,8 @@
 </file>
 
 <file path=ppt/slideLayouts/slideLayout7.xml><?xml version="1.0" encoding="utf-8"?>
-<p:sldLayout xmlns:a="http://schemas.openxmlformats.org/drawingml/2006/main" xmlns:r="http://schemas.openxmlformats.org/officeDocument/2006/relationships" xmlns:mc="http://schemas.openxmlformats.org/markup-compatibility/2006" xmlns:mv="urn:schemas-microsoft-com:mac:vml" xmlns:p="http://schemas.openxmlformats.org/presentationml/2006/main" xmlns:c="http://schemas.openxmlformats.org/drawingml/2006/chart" xmlns:dgm="http://schemas.openxmlformats.org/drawingml/2006/diagram" xmlns:o="urn:schemas-microsoft-com:office:office" xmlns:v="urn:schemas-microsoft-com:vml" xmlns:pvml="urn:schemas-microsoft-com:office:powerpoint" xmlns:com="http://schemas.openxmlformats.org/drawingml/2006/compatibility" xmlns:p14="http://schemas.microsoft.com/office/powerpoint/2010/main" xmlns:p15="http://schemas.microsoft.com/office/powerpoint/2012/main" type="titleOnly">
-  <p:cSld name="Title Only">
+<p:sldLayout xmlns:a="http://schemas.openxmlformats.org/drawingml/2006/main" xmlns:r="http://schemas.openxmlformats.org/officeDocument/2006/relationships" xmlns:mc="http://schemas.openxmlformats.org/markup-compatibility/2006" xmlns:mv="urn:schemas-microsoft-com:mac:vml" xmlns:p="http://schemas.openxmlformats.org/presentationml/2006/main" xmlns:c="http://schemas.openxmlformats.org/drawingml/2006/chart" xmlns:dgm="http://schemas.openxmlformats.org/drawingml/2006/diagram" xmlns:o="urn:schemas-microsoft-com:office:office" xmlns:v="urn:schemas-microsoft-com:vml" xmlns:pvml="urn:schemas-microsoft-com:office:powerpoint" xmlns:com="http://schemas.openxmlformats.org/drawingml/2006/compatibility" xmlns:p14="http://schemas.microsoft.com/office/powerpoint/2010/main" xmlns:p15="http://schemas.microsoft.com/office/powerpoint/2012/main" matchingName="Title Only" type="titleOnly">
+  <p:cSld name="TITLE_ONLY">
     <p:spTree>
       <p:nvGrpSpPr>
         <p:cNvPr id="49" name="Shape 49"/>
@@ -12955,8 +13211,8 @@
 </file>
 
 <file path=ppt/slideLayouts/slideLayout8.xml><?xml version="1.0" encoding="utf-8"?>
-<p:sldLayout xmlns:a="http://schemas.openxmlformats.org/drawingml/2006/main" xmlns:r="http://schemas.openxmlformats.org/officeDocument/2006/relationships" xmlns:mc="http://schemas.openxmlformats.org/markup-compatibility/2006" xmlns:mv="urn:schemas-microsoft-com:mac:vml" xmlns:p="http://schemas.openxmlformats.org/presentationml/2006/main" xmlns:c="http://schemas.openxmlformats.org/drawingml/2006/chart" xmlns:dgm="http://schemas.openxmlformats.org/drawingml/2006/diagram" xmlns:o="urn:schemas-microsoft-com:office:office" xmlns:v="urn:schemas-microsoft-com:vml" xmlns:pvml="urn:schemas-microsoft-com:office:powerpoint" xmlns:com="http://schemas.openxmlformats.org/drawingml/2006/compatibility" xmlns:p14="http://schemas.microsoft.com/office/powerpoint/2010/main" xmlns:p15="http://schemas.microsoft.com/office/powerpoint/2012/main" type="objTx">
-  <p:cSld name="Content with Caption">
+<p:sldLayout xmlns:a="http://schemas.openxmlformats.org/drawingml/2006/main" xmlns:r="http://schemas.openxmlformats.org/officeDocument/2006/relationships" xmlns:mc="http://schemas.openxmlformats.org/markup-compatibility/2006" xmlns:mv="urn:schemas-microsoft-com:mac:vml" xmlns:p="http://schemas.openxmlformats.org/presentationml/2006/main" xmlns:c="http://schemas.openxmlformats.org/drawingml/2006/chart" xmlns:dgm="http://schemas.openxmlformats.org/drawingml/2006/diagram" xmlns:o="urn:schemas-microsoft-com:office:office" xmlns:v="urn:schemas-microsoft-com:vml" xmlns:pvml="urn:schemas-microsoft-com:office:powerpoint" xmlns:com="http://schemas.openxmlformats.org/drawingml/2006/compatibility" xmlns:p14="http://schemas.microsoft.com/office/powerpoint/2010/main" xmlns:p15="http://schemas.microsoft.com/office/powerpoint/2012/main" matchingName="Content with Caption" type="objTx">
+  <p:cSld name="OBJECT_WITH_CAPTION_TEXT">
     <p:spTree>
       <p:nvGrpSpPr>
         <p:cNvPr id="54" name="Shape 54"/>
@@ -14465,8 +14721,8 @@
 </file>
 
 <file path=ppt/slideLayouts/slideLayout9.xml><?xml version="1.0" encoding="utf-8"?>
-<p:sldLayout xmlns:a="http://schemas.openxmlformats.org/drawingml/2006/main" xmlns:r="http://schemas.openxmlformats.org/officeDocument/2006/relationships" xmlns:mc="http://schemas.openxmlformats.org/markup-compatibility/2006" xmlns:mv="urn:schemas-microsoft-com:mac:vml" xmlns:p="http://schemas.openxmlformats.org/presentationml/2006/main" xmlns:c="http://schemas.openxmlformats.org/drawingml/2006/chart" xmlns:dgm="http://schemas.openxmlformats.org/drawingml/2006/diagram" xmlns:o="urn:schemas-microsoft-com:office:office" xmlns:v="urn:schemas-microsoft-com:vml" xmlns:pvml="urn:schemas-microsoft-com:office:powerpoint" xmlns:com="http://schemas.openxmlformats.org/drawingml/2006/compatibility" xmlns:p14="http://schemas.microsoft.com/office/powerpoint/2010/main" xmlns:p15="http://schemas.microsoft.com/office/powerpoint/2012/main" type="picTx">
-  <p:cSld name="Picture with Caption">
+<p:sldLayout xmlns:a="http://schemas.openxmlformats.org/drawingml/2006/main" xmlns:r="http://schemas.openxmlformats.org/officeDocument/2006/relationships" xmlns:mc="http://schemas.openxmlformats.org/markup-compatibility/2006" xmlns:mv="urn:schemas-microsoft-com:mac:vml" xmlns:p="http://schemas.openxmlformats.org/presentationml/2006/main" xmlns:c="http://schemas.openxmlformats.org/drawingml/2006/chart" xmlns:dgm="http://schemas.openxmlformats.org/drawingml/2006/diagram" xmlns:o="urn:schemas-microsoft-com:office:office" xmlns:v="urn:schemas-microsoft-com:vml" xmlns:pvml="urn:schemas-microsoft-com:office:powerpoint" xmlns:com="http://schemas.openxmlformats.org/drawingml/2006/compatibility" xmlns:p14="http://schemas.microsoft.com/office/powerpoint/2010/main" xmlns:p15="http://schemas.microsoft.com/office/powerpoint/2012/main" matchingName="Picture with Caption" type="picTx">
+  <p:cSld name="PICTURE_WITH_CAPTION_TEXT">
     <p:spTree>
       <p:nvGrpSpPr>
         <p:cNvPr id="61" name="Shape 61"/>
@@ -17266,7 +17522,10 @@
         <a:spcAft>
           <a:spcPts val="0"/>
         </a:spcAft>
-        <a:buNone/>
+        <a:buClr>
+          <a:srgbClr val="000000"/>
+        </a:buClr>
+        <a:buFont typeface="Arial"/>
         <a:defRPr b="0" i="0" sz="1400" u="none" cap="none" strike="noStrike">
           <a:solidFill>
             <a:srgbClr val="000000"/>
@@ -17277,6 +17536,198 @@
           <a:sym typeface="Arial"/>
         </a:defRPr>
       </a:lvl1pPr>
+      <a:lvl2pPr lvl="1" marR="0" rtl="0" algn="l">
+        <a:lnSpc>
+          <a:spcPct val="100000"/>
+        </a:lnSpc>
+        <a:spcBef>
+          <a:spcPts val="0"/>
+        </a:spcBef>
+        <a:spcAft>
+          <a:spcPts val="0"/>
+        </a:spcAft>
+        <a:buClr>
+          <a:srgbClr val="000000"/>
+        </a:buClr>
+        <a:buFont typeface="Arial"/>
+        <a:defRPr b="0" i="0" sz="1400" u="none" cap="none" strike="noStrike">
+          <a:solidFill>
+            <a:srgbClr val="000000"/>
+          </a:solidFill>
+          <a:latin typeface="Arial"/>
+          <a:ea typeface="Arial"/>
+          <a:cs typeface="Arial"/>
+          <a:sym typeface="Arial"/>
+        </a:defRPr>
+      </a:lvl2pPr>
+      <a:lvl3pPr lvl="2" marR="0" rtl="0" algn="l">
+        <a:lnSpc>
+          <a:spcPct val="100000"/>
+        </a:lnSpc>
+        <a:spcBef>
+          <a:spcPts val="0"/>
+        </a:spcBef>
+        <a:spcAft>
+          <a:spcPts val="0"/>
+        </a:spcAft>
+        <a:buClr>
+          <a:srgbClr val="000000"/>
+        </a:buClr>
+        <a:buFont typeface="Arial"/>
+        <a:defRPr b="0" i="0" sz="1400" u="none" cap="none" strike="noStrike">
+          <a:solidFill>
+            <a:srgbClr val="000000"/>
+          </a:solidFill>
+          <a:latin typeface="Arial"/>
+          <a:ea typeface="Arial"/>
+          <a:cs typeface="Arial"/>
+          <a:sym typeface="Arial"/>
+        </a:defRPr>
+      </a:lvl3pPr>
+      <a:lvl4pPr lvl="3" marR="0" rtl="0" algn="l">
+        <a:lnSpc>
+          <a:spcPct val="100000"/>
+        </a:lnSpc>
+        <a:spcBef>
+          <a:spcPts val="0"/>
+        </a:spcBef>
+        <a:spcAft>
+          <a:spcPts val="0"/>
+        </a:spcAft>
+        <a:buClr>
+          <a:srgbClr val="000000"/>
+        </a:buClr>
+        <a:buFont typeface="Arial"/>
+        <a:defRPr b="0" i="0" sz="1400" u="none" cap="none" strike="noStrike">
+          <a:solidFill>
+            <a:srgbClr val="000000"/>
+          </a:solidFill>
+          <a:latin typeface="Arial"/>
+          <a:ea typeface="Arial"/>
+          <a:cs typeface="Arial"/>
+          <a:sym typeface="Arial"/>
+        </a:defRPr>
+      </a:lvl4pPr>
+      <a:lvl5pPr lvl="4" marR="0" rtl="0" algn="l">
+        <a:lnSpc>
+          <a:spcPct val="100000"/>
+        </a:lnSpc>
+        <a:spcBef>
+          <a:spcPts val="0"/>
+        </a:spcBef>
+        <a:spcAft>
+          <a:spcPts val="0"/>
+        </a:spcAft>
+        <a:buClr>
+          <a:srgbClr val="000000"/>
+        </a:buClr>
+        <a:buFont typeface="Arial"/>
+        <a:defRPr b="0" i="0" sz="1400" u="none" cap="none" strike="noStrike">
+          <a:solidFill>
+            <a:srgbClr val="000000"/>
+          </a:solidFill>
+          <a:latin typeface="Arial"/>
+          <a:ea typeface="Arial"/>
+          <a:cs typeface="Arial"/>
+          <a:sym typeface="Arial"/>
+        </a:defRPr>
+      </a:lvl5pPr>
+      <a:lvl6pPr lvl="5" marR="0" rtl="0" algn="l">
+        <a:lnSpc>
+          <a:spcPct val="100000"/>
+        </a:lnSpc>
+        <a:spcBef>
+          <a:spcPts val="0"/>
+        </a:spcBef>
+        <a:spcAft>
+          <a:spcPts val="0"/>
+        </a:spcAft>
+        <a:buClr>
+          <a:srgbClr val="000000"/>
+        </a:buClr>
+        <a:buFont typeface="Arial"/>
+        <a:defRPr b="0" i="0" sz="1400" u="none" cap="none" strike="noStrike">
+          <a:solidFill>
+            <a:srgbClr val="000000"/>
+          </a:solidFill>
+          <a:latin typeface="Arial"/>
+          <a:ea typeface="Arial"/>
+          <a:cs typeface="Arial"/>
+          <a:sym typeface="Arial"/>
+        </a:defRPr>
+      </a:lvl6pPr>
+      <a:lvl7pPr lvl="6" marR="0" rtl="0" algn="l">
+        <a:lnSpc>
+          <a:spcPct val="100000"/>
+        </a:lnSpc>
+        <a:spcBef>
+          <a:spcPts val="0"/>
+        </a:spcBef>
+        <a:spcAft>
+          <a:spcPts val="0"/>
+        </a:spcAft>
+        <a:buClr>
+          <a:srgbClr val="000000"/>
+        </a:buClr>
+        <a:buFont typeface="Arial"/>
+        <a:defRPr b="0" i="0" sz="1400" u="none" cap="none" strike="noStrike">
+          <a:solidFill>
+            <a:srgbClr val="000000"/>
+          </a:solidFill>
+          <a:latin typeface="Arial"/>
+          <a:ea typeface="Arial"/>
+          <a:cs typeface="Arial"/>
+          <a:sym typeface="Arial"/>
+        </a:defRPr>
+      </a:lvl7pPr>
+      <a:lvl8pPr lvl="7" marR="0" rtl="0" algn="l">
+        <a:lnSpc>
+          <a:spcPct val="100000"/>
+        </a:lnSpc>
+        <a:spcBef>
+          <a:spcPts val="0"/>
+        </a:spcBef>
+        <a:spcAft>
+          <a:spcPts val="0"/>
+        </a:spcAft>
+        <a:buClr>
+          <a:srgbClr val="000000"/>
+        </a:buClr>
+        <a:buFont typeface="Arial"/>
+        <a:defRPr b="0" i="0" sz="1400" u="none" cap="none" strike="noStrike">
+          <a:solidFill>
+            <a:srgbClr val="000000"/>
+          </a:solidFill>
+          <a:latin typeface="Arial"/>
+          <a:ea typeface="Arial"/>
+          <a:cs typeface="Arial"/>
+          <a:sym typeface="Arial"/>
+        </a:defRPr>
+      </a:lvl8pPr>
+      <a:lvl9pPr lvl="8" marR="0" rtl="0" algn="l">
+        <a:lnSpc>
+          <a:spcPct val="100000"/>
+        </a:lnSpc>
+        <a:spcBef>
+          <a:spcPts val="0"/>
+        </a:spcBef>
+        <a:spcAft>
+          <a:spcPts val="0"/>
+        </a:spcAft>
+        <a:buClr>
+          <a:srgbClr val="000000"/>
+        </a:buClr>
+        <a:buFont typeface="Arial"/>
+        <a:defRPr b="0" i="0" sz="1400" u="none" cap="none" strike="noStrike">
+          <a:solidFill>
+            <a:srgbClr val="000000"/>
+          </a:solidFill>
+          <a:latin typeface="Arial"/>
+          <a:ea typeface="Arial"/>
+          <a:cs typeface="Arial"/>
+          <a:sym typeface="Arial"/>
+        </a:defRPr>
+      </a:lvl9pPr>
     </p:titleStyle>
     <p:bodyStyle>
       <a:defPPr lvl="0" marR="0" rtl="0" algn="l">
@@ -17300,7 +17751,10 @@
         <a:spcAft>
           <a:spcPts val="0"/>
         </a:spcAft>
-        <a:buNone/>
+        <a:buClr>
+          <a:srgbClr val="000000"/>
+        </a:buClr>
+        <a:buFont typeface="Arial"/>
         <a:defRPr b="0" i="0" sz="1400" u="none" cap="none" strike="noStrike">
           <a:solidFill>
             <a:srgbClr val="000000"/>
@@ -17321,7 +17775,10 @@
         <a:spcAft>
           <a:spcPts val="0"/>
         </a:spcAft>
-        <a:buNone/>
+        <a:buClr>
+          <a:srgbClr val="000000"/>
+        </a:buClr>
+        <a:buFont typeface="Arial"/>
         <a:defRPr b="0" i="0" sz="1400" u="none" cap="none" strike="noStrike">
           <a:solidFill>
             <a:srgbClr val="000000"/>
@@ -17342,7 +17799,10 @@
         <a:spcAft>
           <a:spcPts val="0"/>
         </a:spcAft>
-        <a:buNone/>
+        <a:buClr>
+          <a:srgbClr val="000000"/>
+        </a:buClr>
+        <a:buFont typeface="Arial"/>
         <a:defRPr b="0" i="0" sz="1400" u="none" cap="none" strike="noStrike">
           <a:solidFill>
             <a:srgbClr val="000000"/>
@@ -17363,7 +17823,10 @@
         <a:spcAft>
           <a:spcPts val="0"/>
         </a:spcAft>
-        <a:buNone/>
+        <a:buClr>
+          <a:srgbClr val="000000"/>
+        </a:buClr>
+        <a:buFont typeface="Arial"/>
         <a:defRPr b="0" i="0" sz="1400" u="none" cap="none" strike="noStrike">
           <a:solidFill>
             <a:srgbClr val="000000"/>
@@ -17384,7 +17847,10 @@
         <a:spcAft>
           <a:spcPts val="0"/>
         </a:spcAft>
-        <a:buNone/>
+        <a:buClr>
+          <a:srgbClr val="000000"/>
+        </a:buClr>
+        <a:buFont typeface="Arial"/>
         <a:defRPr b="0" i="0" sz="1400" u="none" cap="none" strike="noStrike">
           <a:solidFill>
             <a:srgbClr val="000000"/>
@@ -17405,7 +17871,10 @@
         <a:spcAft>
           <a:spcPts val="0"/>
         </a:spcAft>
-        <a:buNone/>
+        <a:buClr>
+          <a:srgbClr val="000000"/>
+        </a:buClr>
+        <a:buFont typeface="Arial"/>
         <a:defRPr b="0" i="0" sz="1400" u="none" cap="none" strike="noStrike">
           <a:solidFill>
             <a:srgbClr val="000000"/>
@@ -17426,7 +17895,10 @@
         <a:spcAft>
           <a:spcPts val="0"/>
         </a:spcAft>
-        <a:buNone/>
+        <a:buClr>
+          <a:srgbClr val="000000"/>
+        </a:buClr>
+        <a:buFont typeface="Arial"/>
         <a:defRPr b="0" i="0" sz="1400" u="none" cap="none" strike="noStrike">
           <a:solidFill>
             <a:srgbClr val="000000"/>
@@ -17447,7 +17919,10 @@
         <a:spcAft>
           <a:spcPts val="0"/>
         </a:spcAft>
-        <a:buNone/>
+        <a:buClr>
+          <a:srgbClr val="000000"/>
+        </a:buClr>
+        <a:buFont typeface="Arial"/>
         <a:defRPr b="0" i="0" sz="1400" u="none" cap="none" strike="noStrike">
           <a:solidFill>
             <a:srgbClr val="000000"/>
@@ -17468,7 +17943,10 @@
         <a:spcAft>
           <a:spcPts val="0"/>
         </a:spcAft>
-        <a:buNone/>
+        <a:buClr>
+          <a:srgbClr val="000000"/>
+        </a:buClr>
+        <a:buFont typeface="Arial"/>
         <a:defRPr b="0" i="0" sz="1400" u="none" cap="none" strike="noStrike">
           <a:solidFill>
             <a:srgbClr val="000000"/>
@@ -17502,7 +17980,10 @@
         <a:spcAft>
           <a:spcPts val="0"/>
         </a:spcAft>
-        <a:buNone/>
+        <a:buClr>
+          <a:srgbClr val="000000"/>
+        </a:buClr>
+        <a:buFont typeface="Arial"/>
         <a:defRPr b="0" i="0" sz="1400" u="none" cap="none" strike="noStrike">
           <a:solidFill>
             <a:srgbClr val="000000"/>
@@ -17523,7 +18004,10 @@
         <a:spcAft>
           <a:spcPts val="0"/>
         </a:spcAft>
-        <a:buNone/>
+        <a:buClr>
+          <a:srgbClr val="000000"/>
+        </a:buClr>
+        <a:buFont typeface="Arial"/>
         <a:defRPr b="0" i="0" sz="1400" u="none" cap="none" strike="noStrike">
           <a:solidFill>
             <a:srgbClr val="000000"/>
@@ -17544,7 +18028,10 @@
         <a:spcAft>
           <a:spcPts val="0"/>
         </a:spcAft>
-        <a:buNone/>
+        <a:buClr>
+          <a:srgbClr val="000000"/>
+        </a:buClr>
+        <a:buFont typeface="Arial"/>
         <a:defRPr b="0" i="0" sz="1400" u="none" cap="none" strike="noStrike">
           <a:solidFill>
             <a:srgbClr val="000000"/>
@@ -17565,7 +18052,10 @@
         <a:spcAft>
           <a:spcPts val="0"/>
         </a:spcAft>
-        <a:buNone/>
+        <a:buClr>
+          <a:srgbClr val="000000"/>
+        </a:buClr>
+        <a:buFont typeface="Arial"/>
         <a:defRPr b="0" i="0" sz="1400" u="none" cap="none" strike="noStrike">
           <a:solidFill>
             <a:srgbClr val="000000"/>
@@ -17586,7 +18076,10 @@
         <a:spcAft>
           <a:spcPts val="0"/>
         </a:spcAft>
-        <a:buNone/>
+        <a:buClr>
+          <a:srgbClr val="000000"/>
+        </a:buClr>
+        <a:buFont typeface="Arial"/>
         <a:defRPr b="0" i="0" sz="1400" u="none" cap="none" strike="noStrike">
           <a:solidFill>
             <a:srgbClr val="000000"/>
@@ -17607,7 +18100,10 @@
         <a:spcAft>
           <a:spcPts val="0"/>
         </a:spcAft>
-        <a:buNone/>
+        <a:buClr>
+          <a:srgbClr val="000000"/>
+        </a:buClr>
+        <a:buFont typeface="Arial"/>
         <a:defRPr b="0" i="0" sz="1400" u="none" cap="none" strike="noStrike">
           <a:solidFill>
             <a:srgbClr val="000000"/>
@@ -17628,7 +18124,10 @@
         <a:spcAft>
           <a:spcPts val="0"/>
         </a:spcAft>
-        <a:buNone/>
+        <a:buClr>
+          <a:srgbClr val="000000"/>
+        </a:buClr>
+        <a:buFont typeface="Arial"/>
         <a:defRPr b="0" i="0" sz="1400" u="none" cap="none" strike="noStrike">
           <a:solidFill>
             <a:srgbClr val="000000"/>
@@ -17649,7 +18148,10 @@
         <a:spcAft>
           <a:spcPts val="0"/>
         </a:spcAft>
-        <a:buNone/>
+        <a:buClr>
+          <a:srgbClr val="000000"/>
+        </a:buClr>
+        <a:buFont typeface="Arial"/>
         <a:defRPr b="0" i="0" sz="1400" u="none" cap="none" strike="noStrike">
           <a:solidFill>
             <a:srgbClr val="000000"/>
@@ -17670,7 +18172,10 @@
         <a:spcAft>
           <a:spcPts val="0"/>
         </a:spcAft>
-        <a:buNone/>
+        <a:buClr>
+          <a:srgbClr val="000000"/>
+        </a:buClr>
+        <a:buFont typeface="Arial"/>
         <a:defRPr b="0" i="0" sz="1400" u="none" cap="none" strike="noStrike">
           <a:solidFill>
             <a:srgbClr val="000000"/>
@@ -19813,6 +20318,43 @@
             <a:r>
               <a:rPr lang="en-US"/>
               <a:t>expo(x, y)</a:t>
+            </a:r>
+            <a:endParaRPr/>
+          </a:p>
+          <a:p>
+            <a:pPr indent="0" lvl="0" marL="0" marR="0" rtl="0" algn="l">
+              <a:lnSpc>
+                <a:spcPct val="90000"/>
+              </a:lnSpc>
+              <a:spcBef>
+                <a:spcPts val="1000"/>
+              </a:spcBef>
+              <a:spcAft>
+                <a:spcPts val="0"/>
+              </a:spcAft>
+              <a:buNone/>
+            </a:pPr>
+            <a:r>
+              <a:t/>
+            </a:r>
+            <a:endParaRPr/>
+          </a:p>
+          <a:p>
+            <a:pPr indent="0" lvl="0" marL="0" marR="0" rtl="0" algn="l">
+              <a:lnSpc>
+                <a:spcPct val="90000"/>
+              </a:lnSpc>
+              <a:spcBef>
+                <a:spcPts val="1000"/>
+              </a:spcBef>
+              <a:spcAft>
+                <a:spcPts val="0"/>
+              </a:spcAft>
+              <a:buNone/>
+            </a:pPr>
+            <a:r>
+              <a:rPr lang="en-US"/>
+              <a:t>Your function should return a value and then print it in “main”.</a:t>
             </a:r>
             <a:endParaRPr/>
           </a:p>
@@ -20636,6 +21178,285 @@
 </file>
 
 <file path=ppt/theme/theme1.xml><?xml version="1.0" encoding="utf-8"?>
+<a:theme xmlns:a="http://schemas.openxmlformats.org/drawingml/2006/main" xmlns:r="http://schemas.openxmlformats.org/officeDocument/2006/relationships" name="Custom Theme">
+  <a:themeElements>
+    <a:clrScheme name="Default">
+      <a:dk1>
+        <a:srgbClr val="000000"/>
+      </a:dk1>
+      <a:lt1>
+        <a:srgbClr val="FFFFFF"/>
+      </a:lt1>
+      <a:dk2>
+        <a:srgbClr val="158158"/>
+      </a:dk2>
+      <a:lt2>
+        <a:srgbClr val="F3F3F3"/>
+      </a:lt2>
+      <a:accent1>
+        <a:srgbClr val="058DC7"/>
+      </a:accent1>
+      <a:accent2>
+        <a:srgbClr val="50B432"/>
+      </a:accent2>
+      <a:accent3>
+        <a:srgbClr val="ED561B"/>
+      </a:accent3>
+      <a:accent4>
+        <a:srgbClr val="EDEF00"/>
+      </a:accent4>
+      <a:accent5>
+        <a:srgbClr val="24CBE5"/>
+      </a:accent5>
+      <a:accent6>
+        <a:srgbClr val="64E572"/>
+      </a:accent6>
+      <a:hlink>
+        <a:srgbClr val="2200CC"/>
+      </a:hlink>
+      <a:folHlink>
+        <a:srgbClr val="551A8B"/>
+      </a:folHlink>
+    </a:clrScheme>
+    <a:fontScheme name="Office">
+      <a:majorFont>
+        <a:latin typeface="Arial"/>
+        <a:ea typeface=""/>
+        <a:cs typeface=""/>
+        <a:font script="Jpan" typeface="ＭＳ Ｐゴシック"/>
+        <a:font script="Hang" typeface="맑은 고딕"/>
+        <a:font script="Hans" typeface="宋体"/>
+        <a:font script="Hant" typeface="新細明體"/>
+        <a:font script="Arab" typeface="Times New Roman"/>
+        <a:font script="Hebr" typeface="Times New Roman"/>
+        <a:font script="Thai" typeface="Angsana New"/>
+        <a:font script="Ethi" typeface="Nyala"/>
+        <a:font script="Beng" typeface="Vrinda"/>
+        <a:font script="Gujr" typeface="Shruti"/>
+        <a:font script="Khmr" typeface="MoolBoran"/>
+        <a:font script="Knda" typeface="Tunga"/>
+        <a:font script="Guru" typeface="Raavi"/>
+        <a:font script="Cans" typeface="Euphemia"/>
+        <a:font script="Cher" typeface="Plantagenet Cherokee"/>
+        <a:font script="Yiii" typeface="Microsoft Yi Baiti"/>
+        <a:font script="Tibt" typeface="Microsoft Himalaya"/>
+        <a:font script="Thaa" typeface="MV Boli"/>
+        <a:font script="Deva" typeface="Mangal"/>
+        <a:font script="Telu" typeface="Gautami"/>
+        <a:font script="Taml" typeface="Latha"/>
+        <a:font script="Syrc" typeface="Estrangelo Edessa"/>
+        <a:font script="Orya" typeface="Kalinga"/>
+        <a:font script="Mlym" typeface="Kartika"/>
+        <a:font script="Laoo" typeface="DokChampa"/>
+        <a:font script="Sinh" typeface="Iskoola Pota"/>
+        <a:font script="Mong" typeface="Mongolian Baiti"/>
+        <a:font script="Viet" typeface="Times New Roman"/>
+        <a:font script="Uigh" typeface="Microsoft Uighur"/>
+        <a:font script="Geor" typeface="Sylfaen"/>
+      </a:majorFont>
+      <a:minorFont>
+        <a:latin typeface="Arial"/>
+        <a:ea typeface=""/>
+        <a:cs typeface=""/>
+        <a:font script="Jpan" typeface="ＭＳ Ｐゴシック"/>
+        <a:font script="Hang" typeface="맑은 고딕"/>
+        <a:font script="Hans" typeface="宋体"/>
+        <a:font script="Hant" typeface="新細明體"/>
+        <a:font script="Arab" typeface="Arial"/>
+        <a:font script="Hebr" typeface="Arial"/>
+        <a:font script="Thai" typeface="Cordia New"/>
+        <a:font script="Ethi" typeface="Nyala"/>
+        <a:font script="Beng" typeface="Vrinda"/>
+        <a:font script="Gujr" typeface="Shruti"/>
+        <a:font script="Khmr" typeface="DaunPenh"/>
+        <a:font script="Knda" typeface="Tunga"/>
+        <a:font script="Guru" typeface="Raavi"/>
+        <a:font script="Cans" typeface="Euphemia"/>
+        <a:font script="Cher" typeface="Plantagenet Cherokee"/>
+        <a:font script="Yiii" typeface="Microsoft Yi Baiti"/>
+        <a:font script="Tibt" typeface="Microsoft Himalaya"/>
+        <a:font script="Thaa" typeface="MV Boli"/>
+        <a:font script="Deva" typeface="Mangal"/>
+        <a:font script="Telu" typeface="Gautami"/>
+        <a:font script="Taml" typeface="Latha"/>
+        <a:font script="Syrc" typeface="Estrangelo Edessa"/>
+        <a:font script="Orya" typeface="Kalinga"/>
+        <a:font script="Mlym" typeface="Kartika"/>
+        <a:font script="Laoo" typeface="DokChampa"/>
+        <a:font script="Sinh" typeface="Iskoola Pota"/>
+        <a:font script="Mong" typeface="Mongolian Baiti"/>
+        <a:font script="Viet" typeface="Arial"/>
+        <a:font script="Uigh" typeface="Microsoft Uighur"/>
+        <a:font script="Geor" typeface="Sylfaen"/>
+      </a:minorFont>
+    </a:fontScheme>
+    <a:fmtScheme name="Office">
+      <a:fillStyleLst>
+        <a:solidFill>
+          <a:schemeClr val="phClr"/>
+        </a:solidFill>
+        <a:gradFill rotWithShape="1">
+          <a:gsLst>
+            <a:gs pos="0">
+              <a:schemeClr val="phClr">
+                <a:tint val="50000"/>
+                <a:satMod val="300000"/>
+              </a:schemeClr>
+            </a:gs>
+            <a:gs pos="35000">
+              <a:schemeClr val="phClr">
+                <a:tint val="37000"/>
+                <a:satMod val="300000"/>
+              </a:schemeClr>
+            </a:gs>
+            <a:gs pos="100000">
+              <a:schemeClr val="phClr">
+                <a:tint val="15000"/>
+                <a:satMod val="350000"/>
+              </a:schemeClr>
+            </a:gs>
+          </a:gsLst>
+          <a:lin ang="16200000" scaled="1"/>
+        </a:gradFill>
+        <a:gradFill rotWithShape="1">
+          <a:gsLst>
+            <a:gs pos="0">
+              <a:schemeClr val="phClr">
+                <a:tint val="100000"/>
+                <a:shade val="100000"/>
+                <a:satMod val="130000"/>
+              </a:schemeClr>
+            </a:gs>
+            <a:gs pos="100000">
+              <a:schemeClr val="phClr">
+                <a:tint val="50000"/>
+                <a:shade val="100000"/>
+                <a:satMod val="350000"/>
+              </a:schemeClr>
+            </a:gs>
+          </a:gsLst>
+          <a:lin ang="16200000" scaled="0"/>
+        </a:gradFill>
+      </a:fillStyleLst>
+      <a:lnStyleLst>
+        <a:ln w="9525" cap="flat" cmpd="sng" algn="ctr">
+          <a:solidFill>
+            <a:schemeClr val="phClr">
+              <a:shade val="95000"/>
+              <a:satMod val="105000"/>
+            </a:schemeClr>
+          </a:solidFill>
+          <a:prstDash val="solid"/>
+        </a:ln>
+        <a:ln w="25400" cap="flat" cmpd="sng" algn="ctr">
+          <a:solidFill>
+            <a:schemeClr val="phClr"/>
+          </a:solidFill>
+          <a:prstDash val="solid"/>
+        </a:ln>
+        <a:ln w="38100" cap="flat" cmpd="sng" algn="ctr">
+          <a:solidFill>
+            <a:schemeClr val="phClr"/>
+          </a:solidFill>
+          <a:prstDash val="solid"/>
+        </a:ln>
+      </a:lnStyleLst>
+      <a:effectStyleLst>
+        <a:effectStyle>
+          <a:effectLst>
+            <a:outerShdw blurRad="40000" dist="20000" dir="5400000" rotWithShape="0">
+              <a:srgbClr val="000000">
+                <a:alpha val="38000"/>
+              </a:srgbClr>
+            </a:outerShdw>
+          </a:effectLst>
+        </a:effectStyle>
+        <a:effectStyle>
+          <a:effectLst>
+            <a:outerShdw blurRad="40000" dist="23000" dir="5400000" rotWithShape="0">
+              <a:srgbClr val="000000">
+                <a:alpha val="35000"/>
+              </a:srgbClr>
+            </a:outerShdw>
+          </a:effectLst>
+        </a:effectStyle>
+        <a:effectStyle>
+          <a:effectLst>
+            <a:outerShdw blurRad="40000" dist="23000" dir="5400000" rotWithShape="0">
+              <a:srgbClr val="000000">
+                <a:alpha val="35000"/>
+              </a:srgbClr>
+            </a:outerShdw>
+          </a:effectLst>
+          <a:scene3d>
+            <a:camera prst="orthographicFront">
+              <a:rot lat="0" lon="0" rev="0"/>
+            </a:camera>
+            <a:lightRig rig="threePt" dir="t">
+              <a:rot lat="0" lon="0" rev="1200000"/>
+            </a:lightRig>
+          </a:scene3d>
+          <a:sp3d>
+            <a:bevelT w="63500" h="25400"/>
+          </a:sp3d>
+        </a:effectStyle>
+      </a:effectStyleLst>
+      <a:bgFillStyleLst>
+        <a:solidFill>
+          <a:schemeClr val="phClr"/>
+        </a:solidFill>
+        <a:gradFill rotWithShape="1">
+          <a:gsLst>
+            <a:gs pos="0">
+              <a:schemeClr val="phClr">
+                <a:tint val="40000"/>
+                <a:satMod val="350000"/>
+              </a:schemeClr>
+            </a:gs>
+            <a:gs pos="40000">
+              <a:schemeClr val="phClr">
+                <a:tint val="45000"/>
+                <a:shade val="99000"/>
+                <a:satMod val="350000"/>
+              </a:schemeClr>
+            </a:gs>
+            <a:gs pos="100000">
+              <a:schemeClr val="phClr">
+                <a:shade val="20000"/>
+                <a:satMod val="255000"/>
+              </a:schemeClr>
+            </a:gs>
+          </a:gsLst>
+          <a:path path="circle">
+            <a:fillToRect l="50000" t="-80000" r="50000" b="180000"/>
+          </a:path>
+        </a:gradFill>
+        <a:gradFill rotWithShape="1">
+          <a:gsLst>
+            <a:gs pos="0">
+              <a:schemeClr val="phClr">
+                <a:tint val="80000"/>
+                <a:satMod val="300000"/>
+              </a:schemeClr>
+            </a:gs>
+            <a:gs pos="100000">
+              <a:schemeClr val="phClr">
+                <a:shade val="30000"/>
+                <a:satMod val="200000"/>
+              </a:schemeClr>
+            </a:gs>
+          </a:gsLst>
+          <a:path path="circle">
+            <a:fillToRect l="50000" t="50000" r="50000" b="50000"/>
+          </a:path>
+        </a:gradFill>
+      </a:bgFillStyleLst>
+    </a:fmtScheme>
+  </a:themeElements>
+</a:theme>
+</file>
+
+<file path=ppt/theme/theme2.xml><?xml version="1.0" encoding="utf-8"?>
 <a:theme xmlns:a="http://schemas.openxmlformats.org/drawingml/2006/main" xmlns:r="http://schemas.openxmlformats.org/officeDocument/2006/relationships" name="Office Theme">
   <a:themeElements>
     <a:clrScheme name="Office">
@@ -20912,283 +21733,4 @@
     </a:fmtScheme>
   </a:themeElements>
 </a:theme>
-</file>
-
-<file path=ppt/theme/theme2.xml><?xml version="1.0" encoding="utf-8"?>
-<a:theme xmlns:a="http://schemas.openxmlformats.org/drawingml/2006/main" xmlns:r="http://schemas.openxmlformats.org/officeDocument/2006/relationships" name="Custom Theme">
-  <a:themeElements>
-    <a:clrScheme name="Default">
-      <a:dk1>
-        <a:srgbClr val="000000"/>
-      </a:dk1>
-      <a:lt1>
-        <a:srgbClr val="FFFFFF"/>
-      </a:lt1>
-      <a:dk2>
-        <a:srgbClr val="158158"/>
-      </a:dk2>
-      <a:lt2>
-        <a:srgbClr val="F3F3F3"/>
-      </a:lt2>
-      <a:accent1>
-        <a:srgbClr val="058DC7"/>
-      </a:accent1>
-      <a:accent2>
-        <a:srgbClr val="50B432"/>
-      </a:accent2>
-      <a:accent3>
-        <a:srgbClr val="ED561B"/>
-      </a:accent3>
-      <a:accent4>
-        <a:srgbClr val="EDEF00"/>
-      </a:accent4>
-      <a:accent5>
-        <a:srgbClr val="24CBE5"/>
-      </a:accent5>
-      <a:accent6>
-        <a:srgbClr val="64E572"/>
-      </a:accent6>
-      <a:hlink>
-        <a:srgbClr val="2200CC"/>
-      </a:hlink>
-      <a:folHlink>
-        <a:srgbClr val="551A8B"/>
-      </a:folHlink>
-    </a:clrScheme>
-    <a:fontScheme name="Office">
-      <a:majorFont>
-        <a:latin typeface="Arial"/>
-        <a:ea typeface=""/>
-        <a:cs typeface=""/>
-        <a:font script="Jpan" typeface="ＭＳ Ｐゴシック"/>
-        <a:font script="Hang" typeface="맑은 고딕"/>
-        <a:font script="Hans" typeface="宋体"/>
-        <a:font script="Hant" typeface="新細明體"/>
-        <a:font script="Arab" typeface="Times New Roman"/>
-        <a:font script="Hebr" typeface="Times New Roman"/>
-        <a:font script="Thai" typeface="Angsana New"/>
-        <a:font script="Ethi" typeface="Nyala"/>
-        <a:font script="Beng" typeface="Vrinda"/>
-        <a:font script="Gujr" typeface="Shruti"/>
-        <a:font script="Khmr" typeface="MoolBoran"/>
-        <a:font script="Knda" typeface="Tunga"/>
-        <a:font script="Guru" typeface="Raavi"/>
-        <a:font script="Cans" typeface="Euphemia"/>
-        <a:font script="Cher" typeface="Plantagenet Cherokee"/>
-        <a:font script="Yiii" typeface="Microsoft Yi Baiti"/>
-        <a:font script="Tibt" typeface="Microsoft Himalaya"/>
-        <a:font script="Thaa" typeface="MV Boli"/>
-        <a:font script="Deva" typeface="Mangal"/>
-        <a:font script="Telu" typeface="Gautami"/>
-        <a:font script="Taml" typeface="Latha"/>
-        <a:font script="Syrc" typeface="Estrangelo Edessa"/>
-        <a:font script="Orya" typeface="Kalinga"/>
-        <a:font script="Mlym" typeface="Kartika"/>
-        <a:font script="Laoo" typeface="DokChampa"/>
-        <a:font script="Sinh" typeface="Iskoola Pota"/>
-        <a:font script="Mong" typeface="Mongolian Baiti"/>
-        <a:font script="Viet" typeface="Times New Roman"/>
-        <a:font script="Uigh" typeface="Microsoft Uighur"/>
-        <a:font script="Geor" typeface="Sylfaen"/>
-      </a:majorFont>
-      <a:minorFont>
-        <a:latin typeface="Arial"/>
-        <a:ea typeface=""/>
-        <a:cs typeface=""/>
-        <a:font script="Jpan" typeface="ＭＳ Ｐゴシック"/>
-        <a:font script="Hang" typeface="맑은 고딕"/>
-        <a:font script="Hans" typeface="宋体"/>
-        <a:font script="Hant" typeface="新細明體"/>
-        <a:font script="Arab" typeface="Arial"/>
-        <a:font script="Hebr" typeface="Arial"/>
-        <a:font script="Thai" typeface="Cordia New"/>
-        <a:font script="Ethi" typeface="Nyala"/>
-        <a:font script="Beng" typeface="Vrinda"/>
-        <a:font script="Gujr" typeface="Shruti"/>
-        <a:font script="Khmr" typeface="DaunPenh"/>
-        <a:font script="Knda" typeface="Tunga"/>
-        <a:font script="Guru" typeface="Raavi"/>
-        <a:font script="Cans" typeface="Euphemia"/>
-        <a:font script="Cher" typeface="Plantagenet Cherokee"/>
-        <a:font script="Yiii" typeface="Microsoft Yi Baiti"/>
-        <a:font script="Tibt" typeface="Microsoft Himalaya"/>
-        <a:font script="Thaa" typeface="MV Boli"/>
-        <a:font script="Deva" typeface="Mangal"/>
-        <a:font script="Telu" typeface="Gautami"/>
-        <a:font script="Taml" typeface="Latha"/>
-        <a:font script="Syrc" typeface="Estrangelo Edessa"/>
-        <a:font script="Orya" typeface="Kalinga"/>
-        <a:font script="Mlym" typeface="Kartika"/>
-        <a:font script="Laoo" typeface="DokChampa"/>
-        <a:font script="Sinh" typeface="Iskoola Pota"/>
-        <a:font script="Mong" typeface="Mongolian Baiti"/>
-        <a:font script="Viet" typeface="Arial"/>
-        <a:font script="Uigh" typeface="Microsoft Uighur"/>
-        <a:font script="Geor" typeface="Sylfaen"/>
-      </a:minorFont>
-    </a:fontScheme>
-    <a:fmtScheme name="Office">
-      <a:fillStyleLst>
-        <a:solidFill>
-          <a:schemeClr val="phClr"/>
-        </a:solidFill>
-        <a:gradFill rotWithShape="1">
-          <a:gsLst>
-            <a:gs pos="0">
-              <a:schemeClr val="phClr">
-                <a:tint val="50000"/>
-                <a:satMod val="300000"/>
-              </a:schemeClr>
-            </a:gs>
-            <a:gs pos="35000">
-              <a:schemeClr val="phClr">
-                <a:tint val="37000"/>
-                <a:satMod val="300000"/>
-              </a:schemeClr>
-            </a:gs>
-            <a:gs pos="100000">
-              <a:schemeClr val="phClr">
-                <a:tint val="15000"/>
-                <a:satMod val="350000"/>
-              </a:schemeClr>
-            </a:gs>
-          </a:gsLst>
-          <a:lin ang="16200000" scaled="1"/>
-        </a:gradFill>
-        <a:gradFill rotWithShape="1">
-          <a:gsLst>
-            <a:gs pos="0">
-              <a:schemeClr val="phClr">
-                <a:tint val="100000"/>
-                <a:shade val="100000"/>
-                <a:satMod val="130000"/>
-              </a:schemeClr>
-            </a:gs>
-            <a:gs pos="100000">
-              <a:schemeClr val="phClr">
-                <a:tint val="50000"/>
-                <a:shade val="100000"/>
-                <a:satMod val="350000"/>
-              </a:schemeClr>
-            </a:gs>
-          </a:gsLst>
-          <a:lin ang="16200000" scaled="0"/>
-        </a:gradFill>
-      </a:fillStyleLst>
-      <a:lnStyleLst>
-        <a:ln w="9525" cap="flat" cmpd="sng" algn="ctr">
-          <a:solidFill>
-            <a:schemeClr val="phClr">
-              <a:shade val="95000"/>
-              <a:satMod val="105000"/>
-            </a:schemeClr>
-          </a:solidFill>
-          <a:prstDash val="solid"/>
-        </a:ln>
-        <a:ln w="25400" cap="flat" cmpd="sng" algn="ctr">
-          <a:solidFill>
-            <a:schemeClr val="phClr"/>
-          </a:solidFill>
-          <a:prstDash val="solid"/>
-        </a:ln>
-        <a:ln w="38100" cap="flat" cmpd="sng" algn="ctr">
-          <a:solidFill>
-            <a:schemeClr val="phClr"/>
-          </a:solidFill>
-          <a:prstDash val="solid"/>
-        </a:ln>
-      </a:lnStyleLst>
-      <a:effectStyleLst>
-        <a:effectStyle>
-          <a:effectLst>
-            <a:outerShdw blurRad="40000" dist="20000" dir="5400000" rotWithShape="0">
-              <a:srgbClr val="000000">
-                <a:alpha val="38000"/>
-              </a:srgbClr>
-            </a:outerShdw>
-          </a:effectLst>
-        </a:effectStyle>
-        <a:effectStyle>
-          <a:effectLst>
-            <a:outerShdw blurRad="40000" dist="23000" dir="5400000" rotWithShape="0">
-              <a:srgbClr val="000000">
-                <a:alpha val="35000"/>
-              </a:srgbClr>
-            </a:outerShdw>
-          </a:effectLst>
-        </a:effectStyle>
-        <a:effectStyle>
-          <a:effectLst>
-            <a:outerShdw blurRad="40000" dist="23000" dir="5400000" rotWithShape="0">
-              <a:srgbClr val="000000">
-                <a:alpha val="35000"/>
-              </a:srgbClr>
-            </a:outerShdw>
-          </a:effectLst>
-          <a:scene3d>
-            <a:camera prst="orthographicFront">
-              <a:rot lat="0" lon="0" rev="0"/>
-            </a:camera>
-            <a:lightRig rig="threePt" dir="t">
-              <a:rot lat="0" lon="0" rev="1200000"/>
-            </a:lightRig>
-          </a:scene3d>
-          <a:sp3d>
-            <a:bevelT w="63500" h="25400"/>
-          </a:sp3d>
-        </a:effectStyle>
-      </a:effectStyleLst>
-      <a:bgFillStyleLst>
-        <a:solidFill>
-          <a:schemeClr val="phClr"/>
-        </a:solidFill>
-        <a:gradFill rotWithShape="1">
-          <a:gsLst>
-            <a:gs pos="0">
-              <a:schemeClr val="phClr">
-                <a:tint val="40000"/>
-                <a:satMod val="350000"/>
-              </a:schemeClr>
-            </a:gs>
-            <a:gs pos="40000">
-              <a:schemeClr val="phClr">
-                <a:tint val="45000"/>
-                <a:shade val="99000"/>
-                <a:satMod val="350000"/>
-              </a:schemeClr>
-            </a:gs>
-            <a:gs pos="100000">
-              <a:schemeClr val="phClr">
-                <a:shade val="20000"/>
-                <a:satMod val="255000"/>
-              </a:schemeClr>
-            </a:gs>
-          </a:gsLst>
-          <a:path path="circle">
-            <a:fillToRect l="50000" t="-80000" r="50000" b="180000"/>
-          </a:path>
-        </a:gradFill>
-        <a:gradFill rotWithShape="1">
-          <a:gsLst>
-            <a:gs pos="0">
-              <a:schemeClr val="phClr">
-                <a:tint val="80000"/>
-                <a:satMod val="300000"/>
-              </a:schemeClr>
-            </a:gs>
-            <a:gs pos="100000">
-              <a:schemeClr val="phClr">
-                <a:shade val="30000"/>
-                <a:satMod val="200000"/>
-              </a:schemeClr>
-            </a:gs>
-          </a:gsLst>
-          <a:path path="circle">
-            <a:fillToRect l="50000" t="50000" r="50000" b="50000"/>
-          </a:path>
-        </a:gradFill>
-      </a:bgFillStyleLst>
-    </a:fmtScheme>
-  </a:themeElements>
-</a:theme>
 </file>
</xml_diff>